<commit_message>
The various graph analysis and Conclusion in readme file
</commit_message>
<xml_diff>
--- a/LENDING CLUB CASE STUDY.pptx
+++ b/LENDING CLUB CASE STUDY.pptx
@@ -15,6 +15,9 @@
     <p:sldId id="260" r:id="rId9"/>
     <p:sldId id="261" r:id="rId10"/>
     <p:sldId id="265" r:id="rId11"/>
+    <p:sldId id="266" r:id="rId12"/>
+    <p:sldId id="267" r:id="rId13"/>
+    <p:sldId id="268" r:id="rId14"/>
   </p:sldIdLst>
   <p:sldSz cx="12192000" cy="6858000"/>
   <p:notesSz cx="6858000" cy="9144000"/>
@@ -113,6 +116,11 @@
       </a:defRPr>
     </a:lvl9pPr>
   </p:defaultTextStyle>
+  <p:extLst>
+    <p:ext uri="{EFAFB233-063F-42B5-8137-9DF3F51BA10A}">
+      <p15:sldGuideLst xmlns:p15="http://schemas.microsoft.com/office/powerpoint/2012/main"/>
+    </p:ext>
+  </p:extLst>
 </p:presentation>
 </file>
 
@@ -265,7 +273,7 @@
           <a:p>
             <a:fld id="{40C2CD9B-1F44-443B-BE00-44140EA3D113}" type="datetimeFigureOut">
               <a:rPr lang="en-IN" smtClean="0"/>
-              <a:t>08-03-2022</a:t>
+              <a:t>09-03-2022</a:t>
             </a:fld>
             <a:endParaRPr lang="en-IN"/>
           </a:p>
@@ -465,7 +473,7 @@
           <a:p>
             <a:fld id="{40C2CD9B-1F44-443B-BE00-44140EA3D113}" type="datetimeFigureOut">
               <a:rPr lang="en-IN" smtClean="0"/>
-              <a:t>08-03-2022</a:t>
+              <a:t>09-03-2022</a:t>
             </a:fld>
             <a:endParaRPr lang="en-IN"/>
           </a:p>
@@ -675,7 +683,7 @@
           <a:p>
             <a:fld id="{40C2CD9B-1F44-443B-BE00-44140EA3D113}" type="datetimeFigureOut">
               <a:rPr lang="en-IN" smtClean="0"/>
-              <a:t>08-03-2022</a:t>
+              <a:t>09-03-2022</a:t>
             </a:fld>
             <a:endParaRPr lang="en-IN"/>
           </a:p>
@@ -875,7 +883,7 @@
           <a:p>
             <a:fld id="{40C2CD9B-1F44-443B-BE00-44140EA3D113}" type="datetimeFigureOut">
               <a:rPr lang="en-IN" smtClean="0"/>
-              <a:t>08-03-2022</a:t>
+              <a:t>09-03-2022</a:t>
             </a:fld>
             <a:endParaRPr lang="en-IN"/>
           </a:p>
@@ -1151,7 +1159,7 @@
           <a:p>
             <a:fld id="{40C2CD9B-1F44-443B-BE00-44140EA3D113}" type="datetimeFigureOut">
               <a:rPr lang="en-IN" smtClean="0"/>
-              <a:t>08-03-2022</a:t>
+              <a:t>09-03-2022</a:t>
             </a:fld>
             <a:endParaRPr lang="en-IN"/>
           </a:p>
@@ -1419,7 +1427,7 @@
           <a:p>
             <a:fld id="{40C2CD9B-1F44-443B-BE00-44140EA3D113}" type="datetimeFigureOut">
               <a:rPr lang="en-IN" smtClean="0"/>
-              <a:t>08-03-2022</a:t>
+              <a:t>09-03-2022</a:t>
             </a:fld>
             <a:endParaRPr lang="en-IN"/>
           </a:p>
@@ -1834,7 +1842,7 @@
           <a:p>
             <a:fld id="{40C2CD9B-1F44-443B-BE00-44140EA3D113}" type="datetimeFigureOut">
               <a:rPr lang="en-IN" smtClean="0"/>
-              <a:t>08-03-2022</a:t>
+              <a:t>09-03-2022</a:t>
             </a:fld>
             <a:endParaRPr lang="en-IN"/>
           </a:p>
@@ -1976,7 +1984,7 @@
           <a:p>
             <a:fld id="{40C2CD9B-1F44-443B-BE00-44140EA3D113}" type="datetimeFigureOut">
               <a:rPr lang="en-IN" smtClean="0"/>
-              <a:t>08-03-2022</a:t>
+              <a:t>09-03-2022</a:t>
             </a:fld>
             <a:endParaRPr lang="en-IN"/>
           </a:p>
@@ -2089,7 +2097,7 @@
           <a:p>
             <a:fld id="{40C2CD9B-1F44-443B-BE00-44140EA3D113}" type="datetimeFigureOut">
               <a:rPr lang="en-IN" smtClean="0"/>
-              <a:t>08-03-2022</a:t>
+              <a:t>09-03-2022</a:t>
             </a:fld>
             <a:endParaRPr lang="en-IN"/>
           </a:p>
@@ -2402,7 +2410,7 @@
           <a:p>
             <a:fld id="{40C2CD9B-1F44-443B-BE00-44140EA3D113}" type="datetimeFigureOut">
               <a:rPr lang="en-IN" smtClean="0"/>
-              <a:t>08-03-2022</a:t>
+              <a:t>09-03-2022</a:t>
             </a:fld>
             <a:endParaRPr lang="en-IN"/>
           </a:p>
@@ -2691,7 +2699,7 @@
           <a:p>
             <a:fld id="{40C2CD9B-1F44-443B-BE00-44140EA3D113}" type="datetimeFigureOut">
               <a:rPr lang="en-IN" smtClean="0"/>
-              <a:t>08-03-2022</a:t>
+              <a:t>09-03-2022</a:t>
             </a:fld>
             <a:endParaRPr lang="en-IN"/>
           </a:p>
@@ -2934,7 +2942,7 @@
           <a:p>
             <a:fld id="{40C2CD9B-1F44-443B-BE00-44140EA3D113}" type="datetimeFigureOut">
               <a:rPr lang="en-IN" smtClean="0"/>
-              <a:t>08-03-2022</a:t>
+              <a:t>09-03-2022</a:t>
             </a:fld>
             <a:endParaRPr lang="en-IN"/>
           </a:p>
@@ -3607,6 +3615,464 @@
 </p:sld>
 </file>
 
+<file path=ppt/slides/slide11.xml><?xml version="1.0" encoding="utf-8"?>
+<p:sld xmlns:a="http://schemas.openxmlformats.org/drawingml/2006/main" xmlns:r="http://schemas.openxmlformats.org/officeDocument/2006/relationships" xmlns:p="http://schemas.openxmlformats.org/presentationml/2006/main">
+  <p:cSld>
+    <p:spTree>
+      <p:nvGrpSpPr>
+        <p:cNvPr id="1" name=""/>
+        <p:cNvGrpSpPr/>
+        <p:nvPr/>
+      </p:nvGrpSpPr>
+      <p:grpSpPr>
+        <a:xfrm>
+          <a:off x="0" y="0"/>
+          <a:ext cx="0" cy="0"/>
+          <a:chOff x="0" y="0"/>
+          <a:chExt cx="0" cy="0"/>
+        </a:xfrm>
+      </p:grpSpPr>
+      <p:pic>
+        <p:nvPicPr>
+          <p:cNvPr id="3" name="Picture 2">
+            <a:extLst>
+              <a:ext uri="{FF2B5EF4-FFF2-40B4-BE49-F238E27FC236}">
+                <a16:creationId xmlns:a16="http://schemas.microsoft.com/office/drawing/2014/main" id="{AA4C3EED-ADF6-4FF4-8A4A-1B32F01C0FEC}"/>
+              </a:ext>
+            </a:extLst>
+          </p:cNvPr>
+          <p:cNvPicPr>
+            <a:picLocks noChangeAspect="1"/>
+          </p:cNvPicPr>
+          <p:nvPr/>
+        </p:nvPicPr>
+        <p:blipFill>
+          <a:blip r:embed="rId2"/>
+          <a:stretch>
+            <a:fillRect/>
+          </a:stretch>
+        </p:blipFill>
+        <p:spPr>
+          <a:xfrm>
+            <a:off x="0" y="464621"/>
+            <a:ext cx="7734300" cy="5928757"/>
+          </a:xfrm>
+          <a:prstGeom prst="rect">
+            <a:avLst/>
+          </a:prstGeom>
+        </p:spPr>
+      </p:pic>
+      <p:sp>
+        <p:nvSpPr>
+          <p:cNvPr id="4" name="TextBox 3">
+            <a:extLst>
+              <a:ext uri="{FF2B5EF4-FFF2-40B4-BE49-F238E27FC236}">
+                <a16:creationId xmlns:a16="http://schemas.microsoft.com/office/drawing/2014/main" id="{00A0055B-0788-431E-BC81-85AEA35C7309}"/>
+              </a:ext>
+            </a:extLst>
+          </p:cNvPr>
+          <p:cNvSpPr txBox="1"/>
+          <p:nvPr/>
+        </p:nvSpPr>
+        <p:spPr>
+          <a:xfrm>
+            <a:off x="7877175" y="1390650"/>
+            <a:ext cx="4314825" cy="4031873"/>
+          </a:xfrm>
+          <a:prstGeom prst="rect">
+            <a:avLst/>
+          </a:prstGeom>
+          <a:noFill/>
+        </p:spPr>
+        <p:txBody>
+          <a:bodyPr wrap="square" rtlCol="0">
+            <a:spAutoFit/>
+          </a:bodyPr>
+          <a:lstStyle/>
+          <a:p>
+            <a:r>
+              <a:rPr lang="en-US" sz="3200" dirty="0">
+                <a:solidFill>
+                  <a:srgbClr val="92D050"/>
+                </a:solidFill>
+              </a:rPr>
+              <a:t>This graph shows that the employee with more experience tend to fully pay the loan. So an experience employee will have a high chance of being in non defaulter list.</a:t>
+            </a:r>
+            <a:endParaRPr lang="en-IN" sz="3200" dirty="0">
+              <a:solidFill>
+                <a:srgbClr val="92D050"/>
+              </a:solidFill>
+            </a:endParaRPr>
+          </a:p>
+        </p:txBody>
+      </p:sp>
+    </p:spTree>
+    <p:extLst>
+      <p:ext uri="{BB962C8B-B14F-4D97-AF65-F5344CB8AC3E}">
+        <p14:creationId xmlns:p14="http://schemas.microsoft.com/office/powerpoint/2010/main" val="1430610978"/>
+      </p:ext>
+    </p:extLst>
+  </p:cSld>
+  <p:clrMapOvr>
+    <a:masterClrMapping/>
+  </p:clrMapOvr>
+</p:sld>
+</file>
+
+<file path=ppt/slides/slide12.xml><?xml version="1.0" encoding="utf-8"?>
+<p:sld xmlns:a="http://schemas.openxmlformats.org/drawingml/2006/main" xmlns:r="http://schemas.openxmlformats.org/officeDocument/2006/relationships" xmlns:p="http://schemas.openxmlformats.org/presentationml/2006/main">
+  <p:cSld>
+    <p:spTree>
+      <p:nvGrpSpPr>
+        <p:cNvPr id="1" name=""/>
+        <p:cNvGrpSpPr/>
+        <p:nvPr/>
+      </p:nvGrpSpPr>
+      <p:grpSpPr>
+        <a:xfrm>
+          <a:off x="0" y="0"/>
+          <a:ext cx="0" cy="0"/>
+          <a:chOff x="0" y="0"/>
+          <a:chExt cx="0" cy="0"/>
+        </a:xfrm>
+      </p:grpSpPr>
+      <p:pic>
+        <p:nvPicPr>
+          <p:cNvPr id="3" name="Picture 2">
+            <a:extLst>
+              <a:ext uri="{FF2B5EF4-FFF2-40B4-BE49-F238E27FC236}">
+                <a16:creationId xmlns:a16="http://schemas.microsoft.com/office/drawing/2014/main" id="{E14F263D-6DDE-4F46-B1C2-47443A707174}"/>
+              </a:ext>
+            </a:extLst>
+          </p:cNvPr>
+          <p:cNvPicPr>
+            <a:picLocks noChangeAspect="1"/>
+          </p:cNvPicPr>
+          <p:nvPr/>
+        </p:nvPicPr>
+        <p:blipFill>
+          <a:blip r:embed="rId2"/>
+          <a:stretch>
+            <a:fillRect/>
+          </a:stretch>
+        </p:blipFill>
+        <p:spPr>
+          <a:xfrm>
+            <a:off x="104775" y="714375"/>
+            <a:ext cx="7105650" cy="6229350"/>
+          </a:xfrm>
+          <a:prstGeom prst="rect">
+            <a:avLst/>
+          </a:prstGeom>
+        </p:spPr>
+      </p:pic>
+      <p:sp>
+        <p:nvSpPr>
+          <p:cNvPr id="4" name="TextBox 3">
+            <a:extLst>
+              <a:ext uri="{FF2B5EF4-FFF2-40B4-BE49-F238E27FC236}">
+                <a16:creationId xmlns:a16="http://schemas.microsoft.com/office/drawing/2014/main" id="{5C76FFB0-B085-4599-A0A6-71AA227BABD5}"/>
+              </a:ext>
+            </a:extLst>
+          </p:cNvPr>
+          <p:cNvSpPr txBox="1"/>
+          <p:nvPr/>
+        </p:nvSpPr>
+        <p:spPr>
+          <a:xfrm>
+            <a:off x="7296150" y="1504950"/>
+            <a:ext cx="4210050" cy="5016758"/>
+          </a:xfrm>
+          <a:prstGeom prst="rect">
+            <a:avLst/>
+          </a:prstGeom>
+          <a:noFill/>
+        </p:spPr>
+        <p:txBody>
+          <a:bodyPr wrap="square" rtlCol="0">
+            <a:spAutoFit/>
+          </a:bodyPr>
+          <a:lstStyle/>
+          <a:p>
+            <a:r>
+              <a:rPr lang="en-US" sz="3200" dirty="0">
+                <a:solidFill>
+                  <a:srgbClr val="92D050"/>
+                </a:solidFill>
+              </a:rPr>
+              <a:t>This </a:t>
+            </a:r>
+            <a:r>
+              <a:rPr lang="en-US" sz="3200" dirty="0" err="1">
+                <a:solidFill>
+                  <a:srgbClr val="92D050"/>
+                </a:solidFill>
+              </a:rPr>
+              <a:t>catplot</a:t>
+            </a:r>
+            <a:r>
+              <a:rPr lang="en-US" sz="3200" dirty="0">
+                <a:solidFill>
+                  <a:srgbClr val="92D050"/>
+                </a:solidFill>
+              </a:rPr>
+              <a:t> analysis of Installment vs </a:t>
+            </a:r>
+            <a:r>
+              <a:rPr lang="en-US" sz="3200" dirty="0" err="1">
+                <a:solidFill>
+                  <a:srgbClr val="92D050"/>
+                </a:solidFill>
+              </a:rPr>
+              <a:t>Loan_amnt_range</a:t>
+            </a:r>
+            <a:r>
+              <a:rPr lang="en-US" sz="3200" dirty="0">
+                <a:solidFill>
+                  <a:srgbClr val="92D050"/>
+                </a:solidFill>
+              </a:rPr>
+              <a:t> tells that the installment or the </a:t>
+            </a:r>
+            <a:r>
+              <a:rPr lang="en-US" sz="3200" dirty="0" err="1">
+                <a:solidFill>
+                  <a:srgbClr val="92D050"/>
+                </a:solidFill>
+              </a:rPr>
+              <a:t>emi</a:t>
+            </a:r>
+            <a:r>
+              <a:rPr lang="en-US" sz="3200" dirty="0">
+                <a:solidFill>
+                  <a:srgbClr val="92D050"/>
+                </a:solidFill>
+              </a:rPr>
+              <a:t> when lies between 20000 tends to get fully paid also the charged of amount varies to certain extent in the graph.</a:t>
+            </a:r>
+            <a:endParaRPr lang="en-IN" sz="3200" dirty="0">
+              <a:solidFill>
+                <a:srgbClr val="92D050"/>
+              </a:solidFill>
+            </a:endParaRPr>
+          </a:p>
+        </p:txBody>
+      </p:sp>
+      <p:sp>
+        <p:nvSpPr>
+          <p:cNvPr id="5" name="TextBox 4">
+            <a:extLst>
+              <a:ext uri="{FF2B5EF4-FFF2-40B4-BE49-F238E27FC236}">
+                <a16:creationId xmlns:a16="http://schemas.microsoft.com/office/drawing/2014/main" id="{A00780EE-F98C-4060-BEBC-46D84912DAF7}"/>
+              </a:ext>
+            </a:extLst>
+          </p:cNvPr>
+          <p:cNvSpPr txBox="1"/>
+          <p:nvPr/>
+        </p:nvSpPr>
+        <p:spPr>
+          <a:xfrm>
+            <a:off x="2762250" y="285750"/>
+            <a:ext cx="5219700" cy="584775"/>
+          </a:xfrm>
+          <a:prstGeom prst="rect">
+            <a:avLst/>
+          </a:prstGeom>
+          <a:noFill/>
+        </p:spPr>
+        <p:txBody>
+          <a:bodyPr wrap="square" rtlCol="0">
+            <a:spAutoFit/>
+          </a:bodyPr>
+          <a:lstStyle/>
+          <a:p>
+            <a:pPr algn="ctr"/>
+            <a:r>
+              <a:rPr lang="en-US" sz="3200" b="1" dirty="0">
+                <a:effectLst>
+                  <a:outerShdw blurRad="38100" dist="38100" dir="2700000" algn="tl">
+                    <a:srgbClr val="000000">
+                      <a:alpha val="43137"/>
+                    </a:srgbClr>
+                  </a:outerShdw>
+                </a:effectLst>
+              </a:rPr>
+              <a:t>BIVARIATE ANALYSIS </a:t>
+            </a:r>
+            <a:endParaRPr lang="en-IN" sz="3200" b="1" dirty="0">
+              <a:effectLst>
+                <a:outerShdw blurRad="38100" dist="38100" dir="2700000" algn="tl">
+                  <a:srgbClr val="000000">
+                    <a:alpha val="43137"/>
+                  </a:srgbClr>
+                </a:outerShdw>
+              </a:effectLst>
+            </a:endParaRPr>
+          </a:p>
+        </p:txBody>
+      </p:sp>
+    </p:spTree>
+    <p:extLst>
+      <p:ext uri="{BB962C8B-B14F-4D97-AF65-F5344CB8AC3E}">
+        <p14:creationId xmlns:p14="http://schemas.microsoft.com/office/powerpoint/2010/main" val="2158490576"/>
+      </p:ext>
+    </p:extLst>
+  </p:cSld>
+  <p:clrMapOvr>
+    <a:masterClrMapping/>
+  </p:clrMapOvr>
+</p:sld>
+</file>
+
+<file path=ppt/slides/slide13.xml><?xml version="1.0" encoding="utf-8"?>
+<p:sld xmlns:a="http://schemas.openxmlformats.org/drawingml/2006/main" xmlns:r="http://schemas.openxmlformats.org/officeDocument/2006/relationships" xmlns:p="http://schemas.openxmlformats.org/presentationml/2006/main">
+  <p:cSld>
+    <p:spTree>
+      <p:nvGrpSpPr>
+        <p:cNvPr id="1" name=""/>
+        <p:cNvGrpSpPr/>
+        <p:nvPr/>
+      </p:nvGrpSpPr>
+      <p:grpSpPr>
+        <a:xfrm>
+          <a:off x="0" y="0"/>
+          <a:ext cx="0" cy="0"/>
+          <a:chOff x="0" y="0"/>
+          <a:chExt cx="0" cy="0"/>
+        </a:xfrm>
+      </p:grpSpPr>
+      <p:pic>
+        <p:nvPicPr>
+          <p:cNvPr id="3" name="Picture 2">
+            <a:extLst>
+              <a:ext uri="{FF2B5EF4-FFF2-40B4-BE49-F238E27FC236}">
+                <a16:creationId xmlns:a16="http://schemas.microsoft.com/office/drawing/2014/main" id="{E71E8B0B-CA79-4CB7-A345-5C52FD72BDB3}"/>
+              </a:ext>
+            </a:extLst>
+          </p:cNvPr>
+          <p:cNvPicPr>
+            <a:picLocks noChangeAspect="1"/>
+          </p:cNvPicPr>
+          <p:nvPr/>
+        </p:nvPicPr>
+        <p:blipFill>
+          <a:blip r:embed="rId2"/>
+          <a:stretch>
+            <a:fillRect/>
+          </a:stretch>
+        </p:blipFill>
+        <p:spPr>
+          <a:xfrm>
+            <a:off x="209550" y="1152525"/>
+            <a:ext cx="6448425" cy="4819650"/>
+          </a:xfrm>
+          <a:prstGeom prst="rect">
+            <a:avLst/>
+          </a:prstGeom>
+        </p:spPr>
+      </p:pic>
+      <p:sp>
+        <p:nvSpPr>
+          <p:cNvPr id="4" name="TextBox 3">
+            <a:extLst>
+              <a:ext uri="{FF2B5EF4-FFF2-40B4-BE49-F238E27FC236}">
+                <a16:creationId xmlns:a16="http://schemas.microsoft.com/office/drawing/2014/main" id="{49CB24C7-3351-48D4-AABA-2758660EFFF8}"/>
+              </a:ext>
+            </a:extLst>
+          </p:cNvPr>
+          <p:cNvSpPr txBox="1"/>
+          <p:nvPr/>
+        </p:nvSpPr>
+        <p:spPr>
+          <a:xfrm>
+            <a:off x="6657975" y="1495425"/>
+            <a:ext cx="4219575" cy="1754326"/>
+          </a:xfrm>
+          <a:prstGeom prst="rect">
+            <a:avLst/>
+          </a:prstGeom>
+          <a:noFill/>
+        </p:spPr>
+        <p:txBody>
+          <a:bodyPr wrap="square" rtlCol="0">
+            <a:spAutoFit/>
+          </a:bodyPr>
+          <a:lstStyle/>
+          <a:p>
+            <a:r>
+              <a:rPr lang="en-US" dirty="0"/>
+              <a:t>This example shows the data plot in terms of all the relevant criteria being used. The correlation of the loan amount with the annual income suggest that annual income if being on higher side tend to help in paying the loan more easily.</a:t>
+            </a:r>
+            <a:endParaRPr lang="en-IN" dirty="0"/>
+          </a:p>
+        </p:txBody>
+      </p:sp>
+      <p:sp>
+        <p:nvSpPr>
+          <p:cNvPr id="5" name="TextBox 4">
+            <a:extLst>
+              <a:ext uri="{FF2B5EF4-FFF2-40B4-BE49-F238E27FC236}">
+                <a16:creationId xmlns:a16="http://schemas.microsoft.com/office/drawing/2014/main" id="{0F3A3A81-A54A-4BC8-A404-DD33F92E6BF5}"/>
+              </a:ext>
+            </a:extLst>
+          </p:cNvPr>
+          <p:cNvSpPr txBox="1"/>
+          <p:nvPr/>
+        </p:nvSpPr>
+        <p:spPr>
+          <a:xfrm>
+            <a:off x="2066925" y="342900"/>
+            <a:ext cx="6924675" cy="584775"/>
+          </a:xfrm>
+          <a:prstGeom prst="rect">
+            <a:avLst/>
+          </a:prstGeom>
+          <a:noFill/>
+        </p:spPr>
+        <p:txBody>
+          <a:bodyPr wrap="square" rtlCol="0">
+            <a:spAutoFit/>
+          </a:bodyPr>
+          <a:lstStyle/>
+          <a:p>
+            <a:pPr algn="ctr"/>
+            <a:r>
+              <a:rPr lang="en-US" sz="3200" b="1" dirty="0">
+                <a:effectLst>
+                  <a:outerShdw blurRad="38100" dist="38100" dir="2700000" algn="tl">
+                    <a:srgbClr val="000000">
+                      <a:alpha val="43137"/>
+                    </a:srgbClr>
+                  </a:outerShdw>
+                </a:effectLst>
+              </a:rPr>
+              <a:t>CORRELATION GRAPH</a:t>
+            </a:r>
+            <a:endParaRPr lang="en-IN" sz="3200" b="1" dirty="0">
+              <a:effectLst>
+                <a:outerShdw blurRad="38100" dist="38100" dir="2700000" algn="tl">
+                  <a:srgbClr val="000000">
+                    <a:alpha val="43137"/>
+                  </a:srgbClr>
+                </a:outerShdw>
+              </a:effectLst>
+            </a:endParaRPr>
+          </a:p>
+        </p:txBody>
+      </p:sp>
+    </p:spTree>
+    <p:extLst>
+      <p:ext uri="{BB962C8B-B14F-4D97-AF65-F5344CB8AC3E}">
+        <p14:creationId xmlns:p14="http://schemas.microsoft.com/office/powerpoint/2010/main" val="3790114802"/>
+      </p:ext>
+    </p:extLst>
+  </p:cSld>
+  <p:clrMapOvr>
+    <a:masterClrMapping/>
+  </p:clrMapOvr>
+</p:sld>
+</file>
+
 <file path=ppt/slides/slide2.xml><?xml version="1.0" encoding="utf-8"?>
 <p:sld xmlns:a="http://schemas.openxmlformats.org/drawingml/2006/main" xmlns:r="http://schemas.openxmlformats.org/officeDocument/2006/relationships" xmlns:p="http://schemas.openxmlformats.org/presentationml/2006/main">
   <p:cSld>
@@ -4401,15 +4867,15 @@
                   <a:srgbClr val="00B050"/>
                 </a:solidFill>
               </a:rPr>
-              <a:t>This box plot shows the loan amount that a person goes and apply in a bank. It is observed that the higher loan amount tends to be having more Emi. Thus this plot relates with the annual income so a person with higher </a:t>
-            </a:r>
-            <a:r>
-              <a:rPr lang="en-US" sz="2400" dirty="0" err="1">
+              <a:t>This box plot shows the loan amount that a person goes and apply in a bank. It is observed that the higher loan amount tends to be having more Emi. Thus this plot relates with the annual income so a person with </a:t>
+            </a:r>
+            <a:r>
+              <a:rPr lang="en-US" sz="2400">
                 <a:solidFill>
                   <a:srgbClr val="00B050"/>
                 </a:solidFill>
               </a:rPr>
-              <a:t>inscome</a:t>
+              <a:t>higher income </a:t>
             </a:r>
             <a:r>
               <a:rPr lang="en-US" sz="2400" dirty="0">
@@ -4417,7 +4883,7 @@
                   <a:srgbClr val="00B050"/>
                 </a:solidFill>
               </a:rPr>
-              <a:t> may opt for a bigger loan amount.</a:t>
+              <a:t>may opt for a bigger loan amount.</a:t>
             </a:r>
             <a:endParaRPr lang="en-IN" sz="2400" dirty="0">
               <a:solidFill>

</xml_diff>